<commit_message>
Added example for microservice based architecture
</commit_message>
<xml_diff>
--- a/slides/09_intent_management.pptx
+++ b/slides/09_intent_management.pptx
@@ -219,7 +219,7 @@
             <a:fld id="{764ED9EE-8F2A-4E06-87A2-36C0DD0993FD}" type="datetime1">
               <a:rPr lang="de-DE" smtClean="0"/>
               <a:pPr rtl="0"/>
-              <a:t>26.12.2020</a:t>
+              <a:t>30.09.2021</a:t>
             </a:fld>
             <a:endParaRPr lang="en-US" dirty="0"/>
           </a:p>
@@ -391,7 +391,7 @@
             <a:fld id="{A5A5ADE8-1FB8-43FD-A675-2B613EE00B6F}" type="datetime1">
               <a:rPr lang="de-DE" smtClean="0"/>
               <a:pPr rtl="0"/>
-              <a:t>26.12.2020</a:t>
+              <a:t>30.09.2021</a:t>
             </a:fld>
             <a:endParaRPr lang="en-US"/>
           </a:p>
@@ -907,7 +907,7 @@
             <a:fld id="{81E9C95E-BEF0-4D2E-9127-B9099B238D2A}" type="datetime1">
               <a:rPr lang="de-DE" smtClean="0"/>
               <a:pPr rtl="0"/>
-              <a:t>26.12.2020</a:t>
+              <a:t>30.09.2021</a:t>
             </a:fld>
             <a:endParaRPr lang="en-US" dirty="0"/>
           </a:p>
@@ -1116,7 +1116,7 @@
             <a:fld id="{FE771757-BB18-44C5-813E-435E78C98126}" type="datetime1">
               <a:rPr lang="de-DE" smtClean="0"/>
               <a:pPr rtl="0"/>
-              <a:t>26.12.2020</a:t>
+              <a:t>30.09.2021</a:t>
             </a:fld>
             <a:endParaRPr lang="en-US" dirty="0"/>
           </a:p>
@@ -1484,7 +1484,7 @@
             <a:fld id="{B83FACD6-565C-4118-ACD0-32ACCA9AF940}" type="datetime1">
               <a:rPr lang="de-DE" smtClean="0"/>
               <a:pPr rtl="0"/>
-              <a:t>26.12.2020</a:t>
+              <a:t>30.09.2021</a:t>
             </a:fld>
             <a:endParaRPr lang="en-US" dirty="0"/>
           </a:p>
@@ -1688,7 +1688,7 @@
             <a:fld id="{83627DD0-092D-4AD9-AAE0-0513E170352E}" type="datetime1">
               <a:rPr lang="de-DE" smtClean="0"/>
               <a:pPr rtl="0"/>
-              <a:t>26.12.2020</a:t>
+              <a:t>30.09.2021</a:t>
             </a:fld>
             <a:endParaRPr lang="en-US" dirty="0"/>
           </a:p>
@@ -2006,7 +2006,7 @@
             <a:fld id="{F36CBEDB-B1DE-4F8C-AD4A-10AD3F77E1A9}" type="datetime1">
               <a:rPr lang="de-DE" smtClean="0"/>
               <a:pPr rtl="0"/>
-              <a:t>26.12.2020</a:t>
+              <a:t>30.09.2021</a:t>
             </a:fld>
             <a:endParaRPr lang="en-US" dirty="0"/>
           </a:p>
@@ -2265,7 +2265,7 @@
             <a:fld id="{F95AE019-BB99-4C3A-AA2C-A36C39CE4DCB}" type="datetime1">
               <a:rPr lang="de-DE" smtClean="0"/>
               <a:pPr rtl="0"/>
-              <a:t>26.12.2020</a:t>
+              <a:t>30.09.2021</a:t>
             </a:fld>
             <a:endParaRPr lang="en-US" dirty="0"/>
           </a:p>
@@ -2693,7 +2693,7 @@
             <a:fld id="{117FAFC6-AD0C-4B5B-B8B0-E729C6D4C810}" type="datetime1">
               <a:rPr lang="de-DE" smtClean="0"/>
               <a:pPr rtl="0"/>
-              <a:t>26.12.2020</a:t>
+              <a:t>30.09.2021</a:t>
             </a:fld>
             <a:endParaRPr lang="en-US" dirty="0"/>
           </a:p>
@@ -2822,7 +2822,7 @@
             <a:fld id="{607DEF3C-A2B0-4F78-836D-1A1B1DEE5467}" type="datetime1">
               <a:rPr lang="de-DE" smtClean="0"/>
               <a:pPr rtl="0"/>
-              <a:t>26.12.2020</a:t>
+              <a:t>30.09.2021</a:t>
             </a:fld>
             <a:endParaRPr lang="en-US" dirty="0"/>
           </a:p>
@@ -2922,7 +2922,7 @@
             <a:fld id="{D971D44B-9C44-467E-B481-41466CDBD2A7}" type="datetime1">
               <a:rPr lang="de-DE" smtClean="0"/>
               <a:pPr rtl="0"/>
-              <a:t>26.12.2020</a:t>
+              <a:t>30.09.2021</a:t>
             </a:fld>
             <a:endParaRPr lang="en-US" dirty="0"/>
           </a:p>
@@ -3305,7 +3305,7 @@
             <a:fld id="{0354EEBD-0E7F-42E6-BE86-4864547D749E}" type="datetime1">
               <a:rPr lang="de-DE" smtClean="0"/>
               <a:pPr rtl="0"/>
-              <a:t>26.12.2020</a:t>
+              <a:t>30.09.2021</a:t>
             </a:fld>
             <a:endParaRPr lang="en-US" dirty="0"/>
           </a:p>
@@ -3604,7 +3604,7 @@
             <a:fld id="{8C7274EF-79A2-4EAD-98EF-7E5BB5EA068D}" type="datetime1">
               <a:rPr lang="de-DE" smtClean="0"/>
               <a:pPr rtl="0"/>
-              <a:t>26.12.2020</a:t>
+              <a:t>30.09.2021</a:t>
             </a:fld>
             <a:endParaRPr lang="en-US" dirty="0"/>
           </a:p>
@@ -3824,7 +3824,7 @@
             <a:fld id="{EDD379EC-906B-4CE5-98C2-3A156331FD9E}" type="datetime1">
               <a:rPr lang="de-DE" smtClean="0"/>
               <a:pPr rtl="0"/>
-              <a:t>26.12.2020</a:t>
+              <a:t>30.09.2021</a:t>
             </a:fld>
             <a:endParaRPr lang="en-US" dirty="0"/>
           </a:p>
@@ -4996,7 +4996,7 @@
             <a:fld id="{83627DD0-092D-4AD9-AAE0-0513E170352E}" type="datetime1">
               <a:rPr lang="de-DE" smtClean="0"/>
               <a:pPr rtl="0"/>
-              <a:t>26.12.2020</a:t>
+              <a:t>30.09.2021</a:t>
             </a:fld>
             <a:endParaRPr lang="en-US" dirty="0"/>
           </a:p>
@@ -5081,7 +5081,7 @@
             <a:fld id="{83627DD0-092D-4AD9-AAE0-0513E170352E}" type="datetime1">
               <a:rPr lang="de-DE" smtClean="0"/>
               <a:pPr rtl="0"/>
-              <a:t>26.12.2020</a:t>
+              <a:t>30.09.2021</a:t>
             </a:fld>
             <a:endParaRPr lang="en-US" dirty="0"/>
           </a:p>
@@ -5673,7 +5673,7 @@
         </p:nvSpPr>
         <p:spPr>
           <a:xfrm>
-            <a:off x="8328958" y="2648810"/>
+            <a:off x="6114705" y="2693555"/>
             <a:ext cx="1564261" cy="725621"/>
           </a:xfrm>
           <a:prstGeom prst="flowChartMagneticDisk">
@@ -5724,14 +5724,14 @@
           <p:cNvCxnSpPr>
             <a:cxnSpLocks/>
             <a:stCxn id="31" idx="2"/>
-            <a:endCxn id="33" idx="1"/>
+            <a:endCxn id="16" idx="0"/>
           </p:cNvCxnSpPr>
           <p:nvPr/>
         </p:nvCxnSpPr>
         <p:spPr>
           <a:xfrm flipH="1">
-            <a:off x="9111089" y="2307139"/>
-            <a:ext cx="2570" cy="341671"/>
+            <a:off x="9109445" y="2307139"/>
+            <a:ext cx="4214" cy="1374058"/>
           </a:xfrm>
           <a:prstGeom prst="straightConnector1">
             <a:avLst/>
@@ -5766,15 +5766,15 @@
           </p:cNvPr>
           <p:cNvCxnSpPr>
             <a:cxnSpLocks/>
-            <a:stCxn id="33" idx="3"/>
+            <a:stCxn id="33" idx="4"/>
             <a:endCxn id="16" idx="0"/>
           </p:cNvCxnSpPr>
           <p:nvPr/>
         </p:nvCxnSpPr>
         <p:spPr>
-          <a:xfrm flipH="1">
-            <a:off x="9109445" y="3374431"/>
-            <a:ext cx="1644" cy="306766"/>
+          <a:xfrm>
+            <a:off x="7678966" y="3056366"/>
+            <a:ext cx="1430479" cy="624831"/>
           </a:xfrm>
           <a:prstGeom prst="straightConnector1">
             <a:avLst/>

</xml_diff>